<commit_message>
cleaned presentation and fixed design issues
</commit_message>
<xml_diff>
--- a/Capstone Project Phase A - Presentation.pptx
+++ b/Capstone Project Phase A - Presentation.pptx
@@ -226,7 +226,7 @@
           </a:lstStyle>
           <a:p>
             <a:fld id="{FDE3BE14-6300-477D-BEDC-7A8101E6ED57}" type="datetimeFigureOut">
-              <a:t>5/23/2024</a:t>
+              <a:t>5/25/2024</a:t>
             </a:fld>
             <a:endParaRPr lang="en-US"/>
           </a:p>
@@ -1014,7 +1014,7 @@
             <a:fld id="{B61BEF0D-F0BB-DE4B-95CE-6DB70DBA9567}" type="datetimeFigureOut">
               <a:rPr lang="en-US" smtClean="0"/>
               <a:pPr/>
-              <a:t>5/23/2024</a:t>
+              <a:t>5/25/2024</a:t>
             </a:fld>
             <a:endParaRPr lang="en-US"/>
           </a:p>
@@ -1326,7 +1326,7 @@
             <a:fld id="{B61BEF0D-F0BB-DE4B-95CE-6DB70DBA9567}" type="datetimeFigureOut">
               <a:rPr lang="en-US" smtClean="0"/>
               <a:pPr/>
-              <a:t>5/23/2024</a:t>
+              <a:t>5/25/2024</a:t>
             </a:fld>
             <a:endParaRPr lang="en-US"/>
           </a:p>
@@ -1549,7 +1549,7 @@
             <a:fld id="{B61BEF0D-F0BB-DE4B-95CE-6DB70DBA9567}" type="datetimeFigureOut">
               <a:rPr lang="en-US" smtClean="0"/>
               <a:pPr/>
-              <a:t>5/23/2024</a:t>
+              <a:t>5/25/2024</a:t>
             </a:fld>
             <a:endParaRPr lang="en-US"/>
           </a:p>
@@ -1841,7 +1841,7 @@
             <a:fld id="{B61BEF0D-F0BB-DE4B-95CE-6DB70DBA9567}" type="datetimeFigureOut">
               <a:rPr lang="en-US" smtClean="0"/>
               <a:pPr/>
-              <a:t>5/23/2024</a:t>
+              <a:t>5/25/2024</a:t>
             </a:fld>
             <a:endParaRPr lang="en-US"/>
           </a:p>
@@ -2296,7 +2296,7 @@
             <a:fld id="{B61BEF0D-F0BB-DE4B-95CE-6DB70DBA9567}" type="datetimeFigureOut">
               <a:rPr lang="en-US" smtClean="0"/>
               <a:pPr/>
-              <a:t>5/23/2024</a:t>
+              <a:t>5/25/2024</a:t>
             </a:fld>
             <a:endParaRPr lang="en-US"/>
           </a:p>
@@ -2873,7 +2873,7 @@
             <a:fld id="{B61BEF0D-F0BB-DE4B-95CE-6DB70DBA9567}" type="datetimeFigureOut">
               <a:rPr lang="en-US" smtClean="0"/>
               <a:pPr/>
-              <a:t>5/23/2024</a:t>
+              <a:t>5/25/2024</a:t>
             </a:fld>
             <a:endParaRPr lang="en-US"/>
           </a:p>
@@ -3723,7 +3723,7 @@
             <a:fld id="{B61BEF0D-F0BB-DE4B-95CE-6DB70DBA9567}" type="datetimeFigureOut">
               <a:rPr lang="en-US" smtClean="0"/>
               <a:pPr/>
-              <a:t>5/23/2024</a:t>
+              <a:t>5/25/2024</a:t>
             </a:fld>
             <a:endParaRPr lang="en-US"/>
           </a:p>
@@ -3928,7 +3928,7 @@
             <a:fld id="{B61BEF0D-F0BB-DE4B-95CE-6DB70DBA9567}" type="datetimeFigureOut">
               <a:rPr lang="en-US" smtClean="0"/>
               <a:pPr/>
-              <a:t>5/23/2024</a:t>
+              <a:t>5/25/2024</a:t>
             </a:fld>
             <a:endParaRPr lang="en-US"/>
           </a:p>
@@ -4142,7 +4142,7 @@
             <a:fld id="{B61BEF0D-F0BB-DE4B-95CE-6DB70DBA9567}" type="datetimeFigureOut">
               <a:rPr lang="en-US" smtClean="0"/>
               <a:pPr/>
-              <a:t>5/23/2024</a:t>
+              <a:t>5/25/2024</a:t>
             </a:fld>
             <a:endParaRPr lang="en-US"/>
           </a:p>
@@ -4318,7 +4318,7 @@
             <a:fld id="{B61BEF0D-F0BB-DE4B-95CE-6DB70DBA9567}" type="datetimeFigureOut">
               <a:rPr lang="en-US" smtClean="0"/>
               <a:pPr/>
-              <a:t>5/23/2024</a:t>
+              <a:t>5/25/2024</a:t>
             </a:fld>
             <a:endParaRPr lang="en-US"/>
           </a:p>
@@ -4523,7 +4523,7 @@
             <a:fld id="{B61BEF0D-F0BB-DE4B-95CE-6DB70DBA9567}" type="datetimeFigureOut">
               <a:rPr lang="en-US" smtClean="0"/>
               <a:pPr/>
-              <a:t>5/23/2024</a:t>
+              <a:t>5/25/2024</a:t>
             </a:fld>
             <a:endParaRPr lang="en-US"/>
           </a:p>
@@ -4804,7 +4804,7 @@
             <a:fld id="{B61BEF0D-F0BB-DE4B-95CE-6DB70DBA9567}" type="datetimeFigureOut">
               <a:rPr lang="en-US" smtClean="0"/>
               <a:pPr/>
-              <a:t>5/23/2024</a:t>
+              <a:t>5/25/2024</a:t>
             </a:fld>
             <a:endParaRPr lang="en-US"/>
           </a:p>
@@ -5070,7 +5070,7 @@
             <a:fld id="{B61BEF0D-F0BB-DE4B-95CE-6DB70DBA9567}" type="datetimeFigureOut">
               <a:rPr lang="en-US" smtClean="0"/>
               <a:pPr/>
-              <a:t>5/23/2024</a:t>
+              <a:t>5/25/2024</a:t>
             </a:fld>
             <a:endParaRPr lang="en-US"/>
           </a:p>
@@ -5484,7 +5484,7 @@
             <a:fld id="{B61BEF0D-F0BB-DE4B-95CE-6DB70DBA9567}" type="datetimeFigureOut">
               <a:rPr lang="en-US" smtClean="0"/>
               <a:pPr/>
-              <a:t>5/23/2024</a:t>
+              <a:t>5/25/2024</a:t>
             </a:fld>
             <a:endParaRPr lang="en-US"/>
           </a:p>
@@ -5633,7 +5633,7 @@
             <a:fld id="{B61BEF0D-F0BB-DE4B-95CE-6DB70DBA9567}" type="datetimeFigureOut">
               <a:rPr lang="en-US" smtClean="0"/>
               <a:pPr/>
-              <a:t>5/23/2024</a:t>
+              <a:t>5/25/2024</a:t>
             </a:fld>
             <a:endParaRPr lang="en-US"/>
           </a:p>
@@ -5760,7 +5760,7 @@
             <a:fld id="{B61BEF0D-F0BB-DE4B-95CE-6DB70DBA9567}" type="datetimeFigureOut">
               <a:rPr lang="en-US" smtClean="0"/>
               <a:pPr/>
-              <a:t>5/23/2024</a:t>
+              <a:t>5/25/2024</a:t>
             </a:fld>
             <a:endParaRPr lang="en-US"/>
           </a:p>
@@ -6039,7 +6039,7 @@
             <a:fld id="{B61BEF0D-F0BB-DE4B-95CE-6DB70DBA9567}" type="datetimeFigureOut">
               <a:rPr lang="en-US" smtClean="0"/>
               <a:pPr/>
-              <a:t>5/23/2024</a:t>
+              <a:t>5/25/2024</a:t>
             </a:fld>
             <a:endParaRPr lang="en-US"/>
           </a:p>
@@ -6351,7 +6351,7 @@
             <a:fld id="{B61BEF0D-F0BB-DE4B-95CE-6DB70DBA9567}" type="datetimeFigureOut">
               <a:rPr lang="en-US" smtClean="0"/>
               <a:pPr/>
-              <a:t>5/23/2024</a:t>
+              <a:t>5/25/2024</a:t>
             </a:fld>
             <a:endParaRPr lang="en-US"/>
           </a:p>
@@ -6604,7 +6604,7 @@
             <a:fld id="{B61BEF0D-F0BB-DE4B-95CE-6DB70DBA9567}" type="datetimeFigureOut">
               <a:rPr lang="en-US" smtClean="0"/>
               <a:pPr/>
-              <a:t>5/23/2024</a:t>
+              <a:t>5/25/2024</a:t>
             </a:fld>
             <a:endParaRPr lang="en-US"/>
           </a:p>
@@ -7127,9 +7127,34 @@
           <a:lstStyle/>
           <a:p>
             <a:r>
-              <a:rPr lang="en-US"/>
-              <a:t>By Rotem Levi and Ofek Malka</a:t>
-            </a:r>
+              <a:rPr lang="en-US" cap="none" dirty="0" smtClean="0"/>
+              <a:t>By Rotem </a:t>
+            </a:r>
+            <a:r>
+              <a:rPr lang="en-US" cap="none" dirty="0"/>
+              <a:t>L</a:t>
+            </a:r>
+            <a:r>
+              <a:rPr lang="en-US" cap="none" dirty="0" smtClean="0"/>
+              <a:t>evi and </a:t>
+            </a:r>
+            <a:r>
+              <a:rPr lang="en-US" cap="none" dirty="0"/>
+              <a:t>O</a:t>
+            </a:r>
+            <a:r>
+              <a:rPr lang="en-US" cap="none" dirty="0" smtClean="0"/>
+              <a:t>fek </a:t>
+            </a:r>
+            <a:r>
+              <a:rPr lang="en-US" cap="none" dirty="0"/>
+              <a:t>M</a:t>
+            </a:r>
+            <a:r>
+              <a:rPr lang="en-US" cap="none" dirty="0" smtClean="0"/>
+              <a:t>alka</a:t>
+            </a:r>
+            <a:endParaRPr lang="en-US" cap="none" dirty="0"/>
           </a:p>
         </p:txBody>
       </p:sp>
@@ -7138,7 +7163,7 @@
           <p:cNvPr id="5" name="Picture 4" descr="A close up of a logo&#10;&#10;Description automatically generated">
             <a:extLst>
               <a:ext uri="{FF2B5EF4-FFF2-40B4-BE49-F238E27FC236}">
-                <a16:creationId xmlns:a16="http://schemas.microsoft.com/office/drawing/2014/main" id="{D00FD3BA-ABA6-630A-2C06-ADDB3ABC7078}"/>
+                <a16:creationId xmlns:a16="http://schemas.microsoft.com/office/drawing/2014/main" xmlns="" id="{D00FD3BA-ABA6-630A-2C06-ADDB3ABC7078}"/>
               </a:ext>
             </a:extLst>
           </p:cNvPr>
@@ -7227,7 +7252,7 @@
           <p:cNvPr id="4" name="Content Placeholder 3">
             <a:extLst>
               <a:ext uri="{FF2B5EF4-FFF2-40B4-BE49-F238E27FC236}">
-                <a16:creationId xmlns:a16="http://schemas.microsoft.com/office/drawing/2014/main" id="{8FAB2334-1FCA-C4DC-0F36-FF994F643E27}"/>
+                <a16:creationId xmlns:a16="http://schemas.microsoft.com/office/drawing/2014/main" xmlns="" id="{8FAB2334-1FCA-C4DC-0F36-FF994F643E27}"/>
               </a:ext>
             </a:extLst>
           </p:cNvPr>
@@ -7265,7 +7290,7 @@
           <p:cNvPr id="5" name="TextBox 4">
             <a:extLst>
               <a:ext uri="{FF2B5EF4-FFF2-40B4-BE49-F238E27FC236}">
-                <a16:creationId xmlns:a16="http://schemas.microsoft.com/office/drawing/2014/main" id="{844F07EE-634E-7C27-53FC-F7B7A3391829}"/>
+                <a16:creationId xmlns:a16="http://schemas.microsoft.com/office/drawing/2014/main" xmlns="" id="{844F07EE-634E-7C27-53FC-F7B7A3391829}"/>
               </a:ext>
             </a:extLst>
           </p:cNvPr>
@@ -7364,7 +7389,7 @@
           <p:cNvPr id="5" name="TextBox 4">
             <a:extLst>
               <a:ext uri="{FF2B5EF4-FFF2-40B4-BE49-F238E27FC236}">
-                <a16:creationId xmlns:a16="http://schemas.microsoft.com/office/drawing/2014/main" id="{844F07EE-634E-7C27-53FC-F7B7A3391829}"/>
+                <a16:creationId xmlns:a16="http://schemas.microsoft.com/office/drawing/2014/main" xmlns="" id="{844F07EE-634E-7C27-53FC-F7B7A3391829}"/>
               </a:ext>
             </a:extLst>
           </p:cNvPr>
@@ -7420,7 +7445,7 @@
           <p:cNvPr id="3" name="Picture 2">
             <a:extLst>
               <a:ext uri="{FF2B5EF4-FFF2-40B4-BE49-F238E27FC236}">
-                <a16:creationId xmlns:a16="http://schemas.microsoft.com/office/drawing/2014/main" id="{37EAB492-87DF-4DDE-0BE2-E92422111256}"/>
+                <a16:creationId xmlns:a16="http://schemas.microsoft.com/office/drawing/2014/main" xmlns="" id="{37EAB492-87DF-4DDE-0BE2-E92422111256}"/>
               </a:ext>
             </a:extLst>
           </p:cNvPr>
@@ -7515,7 +7540,7 @@
           <p:cNvPr id="5" name="TextBox 4">
             <a:extLst>
               <a:ext uri="{FF2B5EF4-FFF2-40B4-BE49-F238E27FC236}">
-                <a16:creationId xmlns:a16="http://schemas.microsoft.com/office/drawing/2014/main" id="{844F07EE-634E-7C27-53FC-F7B7A3391829}"/>
+                <a16:creationId xmlns:a16="http://schemas.microsoft.com/office/drawing/2014/main" xmlns="" id="{844F07EE-634E-7C27-53FC-F7B7A3391829}"/>
               </a:ext>
             </a:extLst>
           </p:cNvPr>
@@ -7555,7 +7580,7 @@
           <p:cNvPr id="3" name="Picture 2">
             <a:extLst>
               <a:ext uri="{FF2B5EF4-FFF2-40B4-BE49-F238E27FC236}">
-                <a16:creationId xmlns:a16="http://schemas.microsoft.com/office/drawing/2014/main" id="{85542BD8-BF8C-6CE3-2945-9F694973D5BE}"/>
+                <a16:creationId xmlns:a16="http://schemas.microsoft.com/office/drawing/2014/main" xmlns="" id="{85542BD8-BF8C-6CE3-2945-9F694973D5BE}"/>
               </a:ext>
             </a:extLst>
           </p:cNvPr>
@@ -7650,7 +7675,7 @@
           <p:cNvPr id="5" name="TextBox 4">
             <a:extLst>
               <a:ext uri="{FF2B5EF4-FFF2-40B4-BE49-F238E27FC236}">
-                <a16:creationId xmlns:a16="http://schemas.microsoft.com/office/drawing/2014/main" id="{844F07EE-634E-7C27-53FC-F7B7A3391829}"/>
+                <a16:creationId xmlns:a16="http://schemas.microsoft.com/office/drawing/2014/main" xmlns="" id="{844F07EE-634E-7C27-53FC-F7B7A3391829}"/>
               </a:ext>
             </a:extLst>
           </p:cNvPr>
@@ -7690,7 +7715,7 @@
           <p:cNvPr id="3" name="Picture 2">
             <a:extLst>
               <a:ext uri="{FF2B5EF4-FFF2-40B4-BE49-F238E27FC236}">
-                <a16:creationId xmlns:a16="http://schemas.microsoft.com/office/drawing/2014/main" id="{73FD71D4-22FB-59A0-4125-0E67EAB3D173}"/>
+                <a16:creationId xmlns:a16="http://schemas.microsoft.com/office/drawing/2014/main" xmlns="" id="{73FD71D4-22FB-59A0-4125-0E67EAB3D173}"/>
               </a:ext>
             </a:extLst>
           </p:cNvPr>
@@ -7735,7 +7760,7 @@
 </file>
 
 <file path=ppt/slides/slide14.xml><?xml version="1.0" encoding="utf-8"?>
-<p:sld xmlns:a="http://schemas.openxmlformats.org/drawingml/2006/main" xmlns:r="http://schemas.openxmlformats.org/officeDocument/2006/relationships" xmlns:p="http://schemas.openxmlformats.org/presentationml/2006/main">
+<p:sld xmlns:a="http://schemas.openxmlformats.org/drawingml/2006/main" xmlns:r="http://schemas.openxmlformats.org/officeDocument/2006/relationships" xmlns:p="http://schemas.openxmlformats.org/presentationml/2006/main" showMasterSp="0">
   <p:cSld>
     <p:spTree>
       <p:nvGrpSpPr>
@@ -7774,27 +7799,34 @@
           <a:lstStyle/>
           <a:p>
             <a:r>
-              <a:rPr lang="en-US" cap="none"/>
-              <a:t>Use case and flow chart </a:t>
-            </a:r>
+              <a:rPr lang="en-US" cap="none" dirty="0"/>
+              <a:t>Use </a:t>
+            </a:r>
+            <a:r>
+              <a:rPr lang="en-US" cap="none" dirty="0" smtClean="0"/>
+              <a:t>Case </a:t>
+            </a:r>
+            <a:r>
+              <a:rPr lang="en-US" cap="none" dirty="0"/>
+              <a:t>and </a:t>
+            </a:r>
+            <a:r>
+              <a:rPr lang="en-US" cap="none" dirty="0" smtClean="0"/>
+              <a:t>Flow Chart Diagrams</a:t>
+            </a:r>
+            <a:endParaRPr lang="en-US" cap="none" dirty="0"/>
           </a:p>
         </p:txBody>
       </p:sp>
       <p:pic>
         <p:nvPicPr>
-          <p:cNvPr id="4" name="Picture 3">
-            <a:extLst>
-              <a:ext uri="{FF2B5EF4-FFF2-40B4-BE49-F238E27FC236}">
-                <a16:creationId xmlns:a16="http://schemas.microsoft.com/office/drawing/2014/main" id="{FDBDD190-E718-40E7-24AC-E7CFF332254B}"/>
-              </a:ext>
-            </a:extLst>
-          </p:cNvPr>
+          <p:cNvPr id="5" name="Picture 4"/>
           <p:cNvPicPr>
             <a:picLocks noChangeAspect="1"/>
           </p:cNvPicPr>
           <p:nvPr/>
         </p:nvPicPr>
-        <p:blipFill rotWithShape="1">
+        <p:blipFill>
           <a:blip r:embed="rId2">
             <a:extLst>
               <a:ext uri="{28A0092B-C50C-407E-A947-70E740481C1C}">
@@ -7802,36 +7834,23 @@
               </a:ext>
             </a:extLst>
           </a:blip>
-          <a:srcRect t="4919"/>
-          <a:stretch/>
+          <a:stretch>
+            <a:fillRect/>
+          </a:stretch>
         </p:blipFill>
-        <p:spPr bwMode="auto">
-          <a:xfrm>
-            <a:off x="5850673" y="1771967"/>
-            <a:ext cx="5943600" cy="3314065"/>
+        <p:spPr>
+          <a:xfrm>
+            <a:off x="6060915" y="1837752"/>
+            <a:ext cx="5943108" cy="3309854"/>
           </a:xfrm>
           <a:prstGeom prst="rect">
             <a:avLst/>
           </a:prstGeom>
-          <a:ln>
-            <a:noFill/>
-          </a:ln>
-          <a:extLst>
-            <a:ext uri="{53640926-AAD7-44D8-BBD7-CCE9431645EC}">
-              <a14:shadowObscured xmlns:a14="http://schemas.microsoft.com/office/drawing/2010/main"/>
-            </a:ext>
-          </a:extLst>
         </p:spPr>
       </p:pic>
       <p:pic>
         <p:nvPicPr>
-          <p:cNvPr id="6" name="Picture 5">
-            <a:extLst>
-              <a:ext uri="{FF2B5EF4-FFF2-40B4-BE49-F238E27FC236}">
-                <a16:creationId xmlns:a16="http://schemas.microsoft.com/office/drawing/2014/main" id="{E71C6EBD-55DD-AE5B-8C0F-526C8EC2BEC8}"/>
-              </a:ext>
-            </a:extLst>
-          </p:cNvPr>
+          <p:cNvPr id="7" name="Picture 6"/>
           <p:cNvPicPr>
             <a:picLocks noChangeAspect="1"/>
           </p:cNvPicPr>
@@ -7851,8 +7870,8 @@
         </p:blipFill>
         <p:spPr>
           <a:xfrm>
-            <a:off x="397727" y="3617912"/>
-            <a:ext cx="5943600" cy="1468120"/>
+            <a:off x="404305" y="3681637"/>
+            <a:ext cx="5940663" cy="1465969"/>
           </a:xfrm>
           <a:prstGeom prst="rect">
             <a:avLst/>
@@ -7901,7 +7920,7 @@
         </p:nvSpPr>
         <p:spPr>
           <a:xfrm>
-            <a:off x="3900455" y="598347"/>
+            <a:off x="3900454" y="236534"/>
             <a:ext cx="4391090" cy="927895"/>
           </a:xfrm>
         </p:spPr>
@@ -7910,7 +7929,7 @@
           <a:lstStyle/>
           <a:p>
             <a:r>
-              <a:rPr lang="en-US" cap="none"/>
+              <a:rPr lang="en-US" cap="none" dirty="0"/>
               <a:t>Testing</a:t>
             </a:r>
           </a:p>
@@ -7921,7 +7940,7 @@
           <p:cNvPr id="4" name="Content Placeholder 3">
             <a:extLst>
               <a:ext uri="{FF2B5EF4-FFF2-40B4-BE49-F238E27FC236}">
-                <a16:creationId xmlns:a16="http://schemas.microsoft.com/office/drawing/2014/main" id="{3F5C4666-8468-E0A7-DFA6-1B54D6D0100B}"/>
+                <a16:creationId xmlns:a16="http://schemas.microsoft.com/office/drawing/2014/main" xmlns="" id="{3F5C4666-8468-E0A7-DFA6-1B54D6D0100B}"/>
               </a:ext>
             </a:extLst>
           </p:cNvPr>
@@ -7939,7 +7958,7 @@
         </p:nvGraphicFramePr>
         <p:xfrm>
           <a:off x="3127375" y="3624698"/>
-          <a:ext cx="5937250" cy="2295144"/>
+          <a:ext cx="5937250" cy="2348484"/>
         </p:xfrm>
         <a:graphic>
           <a:graphicData uri="http://schemas.openxmlformats.org/drawingml/2006/table">
@@ -7951,21 +7970,21 @@
                 <a:gridCol w="213360">
                   <a:extLst>
                     <a:ext uri="{9D8B030D-6E8A-4147-A177-3AD203B41FA5}">
-                      <a16:colId xmlns:a16="http://schemas.microsoft.com/office/drawing/2014/main" val="3328664435"/>
+                      <a16:colId xmlns:a16="http://schemas.microsoft.com/office/drawing/2014/main" xmlns="" val="3328664435"/>
                     </a:ext>
                   </a:extLst>
                 </a:gridCol>
                 <a:gridCol w="2412365">
                   <a:extLst>
                     <a:ext uri="{9D8B030D-6E8A-4147-A177-3AD203B41FA5}">
-                      <a16:colId xmlns:a16="http://schemas.microsoft.com/office/drawing/2014/main" val="2805920364"/>
+                      <a16:colId xmlns:a16="http://schemas.microsoft.com/office/drawing/2014/main" xmlns="" val="2805920364"/>
                     </a:ext>
                   </a:extLst>
                 </a:gridCol>
                 <a:gridCol w="3311525">
                   <a:extLst>
                     <a:ext uri="{9D8B030D-6E8A-4147-A177-3AD203B41FA5}">
-                      <a16:colId xmlns:a16="http://schemas.microsoft.com/office/drawing/2014/main" val="1832231614"/>
+                      <a16:colId xmlns:a16="http://schemas.microsoft.com/office/drawing/2014/main" xmlns="" val="1832231614"/>
                     </a:ext>
                   </a:extLst>
                 </a:gridCol>
@@ -7988,12 +8007,12 @@
                         </a:spcAft>
                       </a:pPr>
                       <a:r>
-                        <a:rPr lang="en-US" sz="1200">
+                        <a:rPr lang="en-US" sz="1200" dirty="0">
                           <a:effectLst/>
                         </a:rPr>
                         <a:t>#</a:t>
                       </a:r>
-                      <a:endParaRPr lang="en-US" sz="1100">
+                      <a:endParaRPr lang="en-US" sz="1100" dirty="0">
                         <a:effectLst/>
                         <a:latin typeface="Calibri" panose="020F0502020204030204" pitchFamily="34" charset="0"/>
                         <a:ea typeface="Calibri" panose="020F0502020204030204" pitchFamily="34" charset="0"/>
@@ -8069,7 +8088,7 @@
                 </a:tc>
                 <a:extLst>
                   <a:ext uri="{0D108BD9-81ED-4DB2-BD59-A6C34878D82A}">
-                    <a16:rowId xmlns:a16="http://schemas.microsoft.com/office/drawing/2014/main" val="2686937045"/>
+                    <a16:rowId xmlns:a16="http://schemas.microsoft.com/office/drawing/2014/main" xmlns="" val="2686937045"/>
                   </a:ext>
                 </a:extLst>
               </a:tr>
@@ -8123,12 +8142,12 @@
                         </a:spcAft>
                       </a:pPr>
                       <a:r>
-                        <a:rPr lang="en-US" sz="1200">
+                        <a:rPr lang="en-US" sz="1200" dirty="0">
                           <a:effectLst/>
                         </a:rPr>
                         <a:t>Click ‘Load Case Scans’ button</a:t>
                       </a:r>
-                      <a:endParaRPr lang="en-US" sz="1100">
+                      <a:endParaRPr lang="en-US" sz="1100" dirty="0">
                         <a:effectLst/>
                         <a:latin typeface="Calibri" panose="020F0502020204030204" pitchFamily="34" charset="0"/>
                         <a:ea typeface="Calibri" panose="020F0502020204030204" pitchFamily="34" charset="0"/>
@@ -8184,7 +8203,7 @@
                 </a:tc>
                 <a:extLst>
                   <a:ext uri="{0D108BD9-81ED-4DB2-BD59-A6C34878D82A}">
-                    <a16:rowId xmlns:a16="http://schemas.microsoft.com/office/drawing/2014/main" val="2375624693"/>
+                    <a16:rowId xmlns:a16="http://schemas.microsoft.com/office/drawing/2014/main" xmlns="" val="2375624693"/>
                   </a:ext>
                 </a:extLst>
               </a:tr>
@@ -8299,7 +8318,7 @@
                 </a:tc>
                 <a:extLst>
                   <a:ext uri="{0D108BD9-81ED-4DB2-BD59-A6C34878D82A}">
-                    <a16:rowId xmlns:a16="http://schemas.microsoft.com/office/drawing/2014/main" val="3355043183"/>
+                    <a16:rowId xmlns:a16="http://schemas.microsoft.com/office/drawing/2014/main" xmlns="" val="3355043183"/>
                   </a:ext>
                 </a:extLst>
               </a:tr>
@@ -8402,7 +8421,7 @@
                 </a:tc>
                 <a:extLst>
                   <a:ext uri="{0D108BD9-81ED-4DB2-BD59-A6C34878D82A}">
-                    <a16:rowId xmlns:a16="http://schemas.microsoft.com/office/drawing/2014/main" val="1079095681"/>
+                    <a16:rowId xmlns:a16="http://schemas.microsoft.com/office/drawing/2014/main" xmlns="" val="1079095681"/>
                   </a:ext>
                 </a:extLst>
               </a:tr>
@@ -8505,7 +8524,7 @@
                 </a:tc>
                 <a:extLst>
                   <a:ext uri="{0D108BD9-81ED-4DB2-BD59-A6C34878D82A}">
-                    <a16:rowId xmlns:a16="http://schemas.microsoft.com/office/drawing/2014/main" val="306802297"/>
+                    <a16:rowId xmlns:a16="http://schemas.microsoft.com/office/drawing/2014/main" xmlns="" val="306802297"/>
                   </a:ext>
                 </a:extLst>
               </a:tr>
@@ -8608,7 +8627,7 @@
                 </a:tc>
                 <a:extLst>
                   <a:ext uri="{0D108BD9-81ED-4DB2-BD59-A6C34878D82A}">
-                    <a16:rowId xmlns:a16="http://schemas.microsoft.com/office/drawing/2014/main" val="2220296853"/>
+                    <a16:rowId xmlns:a16="http://schemas.microsoft.com/office/drawing/2014/main" xmlns="" val="2220296853"/>
                   </a:ext>
                 </a:extLst>
               </a:tr>
@@ -8621,7 +8640,7 @@
           <p:cNvPr id="5" name="TextBox 4">
             <a:extLst>
               <a:ext uri="{FF2B5EF4-FFF2-40B4-BE49-F238E27FC236}">
-                <a16:creationId xmlns:a16="http://schemas.microsoft.com/office/drawing/2014/main" id="{2B61D718-369E-2B77-6EE7-DA129090EF81}"/>
+                <a16:creationId xmlns:a16="http://schemas.microsoft.com/office/drawing/2014/main" xmlns="" id="{2B61D718-369E-2B77-6EE7-DA129090EF81}"/>
               </a:ext>
             </a:extLst>
           </p:cNvPr>
@@ -8630,7 +8649,7 @@
         </p:nvSpPr>
         <p:spPr>
           <a:xfrm>
-            <a:off x="913774" y="1707776"/>
+            <a:off x="979557" y="1484110"/>
             <a:ext cx="10364451" cy="1477328"/>
           </a:xfrm>
           <a:prstGeom prst="rect">
@@ -8649,38 +8668,30 @@
               <a:buChar char="•"/>
             </a:pPr>
             <a:r>
-              <a:rPr lang="en-US"/>
+              <a:rPr lang="en-US" dirty="0"/>
               <a:t>As success criteria for the model, we will use the IoU (intersection over union ratio),</a:t>
             </a:r>
             <a:br>
-              <a:rPr lang="en-US"/>
+              <a:rPr lang="en-US" dirty="0"/>
             </a:br>
             <a:r>
-              <a:rPr lang="en-US"/>
-              <a:t>the Dice coefficient (as a measure of similarity) and the HD (</a:t>
-            </a:r>
-            <a:r>
-              <a:rPr lang="en-US" err="1"/>
-              <a:t>Hausdorff</a:t>
-            </a:r>
-            <a:r>
-              <a:rPr lang="en-US"/>
-              <a:t> Distance) measures.</a:t>
+              <a:rPr lang="en-US" dirty="0"/>
+              <a:t>the Dice coefficient (as a measure of similarity) and the HD (Hausdorff Distance) measures.</a:t>
             </a:r>
             <a:br>
-              <a:rPr lang="en-US"/>
+              <a:rPr lang="en-US" dirty="0"/>
             </a:br>
             <a:r>
-              <a:rPr lang="en-US"/>
+              <a:rPr lang="en-US" dirty="0"/>
               <a:t>We will follow both the per-organ values and the </a:t>
             </a:r>
             <a:r>
-              <a:rPr lang="en-US" err="1"/>
-              <a:t>averages.Testing</a:t>
-            </a:r>
-            <a:r>
-              <a:rPr lang="en-US"/>
-              <a:t> GUI and user interface</a:t>
+              <a:rPr lang="en-US" dirty="0" smtClean="0"/>
+              <a:t>averages. Testing </a:t>
+            </a:r>
+            <a:r>
+              <a:rPr lang="en-US" dirty="0"/>
+              <a:t>GUI and user interface</a:t>
             </a:r>
           </a:p>
           <a:p>
@@ -8688,7 +8699,7 @@
               <a:buFont typeface="Arial" panose="020B0604020202020204" pitchFamily="34" charset="0"/>
               <a:buChar char="•"/>
             </a:pPr>
-            <a:endParaRPr lang="he-IL"/>
+            <a:endParaRPr lang="he-IL" dirty="0"/>
           </a:p>
           <a:p>
             <a:pPr marL="285750" indent="-285750">
@@ -8696,17 +8707,22 @@
               <a:buChar char="•"/>
             </a:pPr>
             <a:r>
-              <a:rPr lang="en-US"/>
+              <a:rPr lang="en-US" dirty="0"/>
               <a:t>Testing of the GUI and user interface</a:t>
             </a:r>
             <a:r>
-              <a:rPr lang="he-IL"/>
+              <a:rPr lang="he-IL" dirty="0"/>
               <a:t> </a:t>
             </a:r>
             <a:r>
-              <a:rPr lang="en-US"/>
-              <a:t>as per the following table.</a:t>
-            </a:r>
+              <a:rPr lang="en-US" dirty="0"/>
+              <a:t>as per the following </a:t>
+            </a:r>
+            <a:r>
+              <a:rPr lang="en-US" dirty="0" smtClean="0"/>
+              <a:t>table:</a:t>
+            </a:r>
+            <a:endParaRPr lang="en-US" dirty="0"/>
           </a:p>
         </p:txBody>
       </p:sp>
@@ -8750,7 +8766,12 @@
             <p:ph type="title"/>
           </p:nvPr>
         </p:nvSpPr>
-        <p:spPr/>
+        <p:spPr>
+          <a:xfrm>
+            <a:off x="907197" y="0"/>
+            <a:ext cx="10364451" cy="1596177"/>
+          </a:xfrm>
+        </p:spPr>
         <p:txBody>
           <a:bodyPr/>
           <a:lstStyle/>
@@ -8775,7 +8796,7 @@
         </p:nvSpPr>
         <p:spPr>
           <a:xfrm>
-            <a:off x="848461" y="2011493"/>
+            <a:off x="848461" y="1537847"/>
             <a:ext cx="10364452" cy="3424107"/>
           </a:xfrm>
         </p:spPr>
@@ -8789,17 +8810,17 @@
               <a:buNone/>
             </a:pPr>
             <a:r>
-              <a:rPr lang="en-US" cap="none"/>
+              <a:rPr lang="en-US" cap="none" dirty="0"/>
               <a:t>Current methods (2024) have mostly focused on the contributions of feature-fusion components, multi-scale skip connections or additional transformer blocks – with each component implemented individually (or in pairs). </a:t>
             </a:r>
-            <a:endParaRPr lang="en-US"/>
+            <a:endParaRPr lang="en-US" dirty="0"/>
           </a:p>
           <a:p>
             <a:pPr marL="0" indent="0">
               <a:buNone/>
             </a:pPr>
             <a:r>
-              <a:rPr lang="en-US" cap="none"/>
+              <a:rPr lang="en-US" cap="none" dirty="0"/>
               <a:t>Our research aims to combine these methods in an efficient method with careful selection of hyperparameters, aiming to provide a new benchmark for GI tract MRI segmentation.</a:t>
             </a:r>
           </a:p>
@@ -8808,7 +8829,7 @@
               <a:buNone/>
             </a:pPr>
             <a:r>
-              <a:rPr lang="en-US" cap="none"/>
+              <a:rPr lang="en-US" cap="none" dirty="0"/>
               <a:t>Additionally, our project will serve as a baseline for future work toward real-time medical image segmentation, with an advanced and intuitive medical GUI system.</a:t>
             </a:r>
           </a:p>
@@ -8854,7 +8875,12 @@
             <p:ph type="title"/>
           </p:nvPr>
         </p:nvSpPr>
-        <p:spPr/>
+        <p:spPr>
+          <a:xfrm>
+            <a:off x="913775" y="79086"/>
+            <a:ext cx="10364451" cy="1596177"/>
+          </a:xfrm>
+        </p:spPr>
         <p:txBody>
           <a:bodyPr/>
           <a:lstStyle/>
@@ -8876,7 +8902,12 @@
             <p:ph idx="1"/>
           </p:nvPr>
         </p:nvSpPr>
-        <p:spPr/>
+        <p:spPr>
+          <a:xfrm>
+            <a:off x="913774" y="1755300"/>
+            <a:ext cx="10364452" cy="3424107"/>
+          </a:xfrm>
+        </p:spPr>
         <p:txBody>
           <a:bodyPr vert="horz" lIns="91440" tIns="45720" rIns="91440" bIns="45720" rtlCol="0" anchor="t">
             <a:normAutofit/>
@@ -8887,13 +8918,13 @@
               <a:buNone/>
             </a:pPr>
             <a:r>
-              <a:rPr lang="en-US" b="1" cap="none">
+              <a:rPr lang="en-US" b="1" cap="none" dirty="0">
                 <a:ea typeface="+mn-lt"/>
                 <a:cs typeface="+mn-lt"/>
               </a:rPr>
               <a:t>Key achievements of our project:</a:t>
             </a:r>
-            <a:endParaRPr lang="en-US" cap="none"/>
+            <a:endParaRPr lang="en-US" cap="none" dirty="0"/>
           </a:p>
           <a:p>
             <a:pPr>
@@ -8902,35 +8933,21 @@
               </a:buClr>
             </a:pPr>
             <a:r>
-              <a:rPr lang="en-US" b="1" cap="none">
+              <a:rPr lang="en-US" b="1" cap="none" dirty="0">
                 <a:ea typeface="+mn-lt"/>
                 <a:cs typeface="+mn-lt"/>
               </a:rPr>
               <a:t>Accuracy metrics:</a:t>
             </a:r>
             <a:r>
-              <a:rPr lang="en-US" cap="none">
+              <a:rPr lang="en-US" cap="none" dirty="0">
                 <a:ea typeface="+mn-lt"/>
                 <a:cs typeface="+mn-lt"/>
               </a:rPr>
-              <a:t> Superior performance via DICE and intersection over union (</a:t>
-            </a:r>
-            <a:r>
-              <a:rPr lang="en-US" cap="none" err="1">
-                <a:ea typeface="+mn-lt"/>
-                <a:cs typeface="+mn-lt"/>
-              </a:rPr>
-              <a:t>IoU</a:t>
-            </a:r>
-            <a:r>
-              <a:rPr lang="en-US" cap="none">
-                <a:ea typeface="+mn-lt"/>
-                <a:cs typeface="+mn-lt"/>
-              </a:rPr>
-              <a:t>) scores, with the aim to exceed current </a:t>
-            </a:r>
-            <a:r>
-              <a:rPr lang="en-US" sz="2100" cap="none">
+              <a:t> Superior performance via DICE and intersection over union (IoU) scores, with the aim to exceed current </a:t>
+            </a:r>
+            <a:r>
+              <a:rPr lang="en-US" sz="2100" cap="none" dirty="0">
                 <a:latin typeface="TW Cen MT"/>
                 <a:ea typeface="+mn-lt"/>
                 <a:cs typeface="+mn-lt"/>
@@ -8938,13 +8955,13 @@
               <a:t>state-of-the-art </a:t>
             </a:r>
             <a:r>
-              <a:rPr lang="en-US" cap="none">
+              <a:rPr lang="en-US" cap="none" dirty="0">
                 <a:ea typeface="+mn-lt"/>
                 <a:cs typeface="+mn-lt"/>
               </a:rPr>
               <a:t>benchmarks.</a:t>
             </a:r>
-            <a:endParaRPr lang="en-US" cap="none"/>
+            <a:endParaRPr lang="en-US" cap="none" dirty="0"/>
           </a:p>
           <a:p>
             <a:pPr>
@@ -8953,20 +8970,20 @@
               </a:buClr>
             </a:pPr>
             <a:r>
-              <a:rPr lang="en-US" b="1" cap="none">
+              <a:rPr lang="en-US" b="1" cap="none" dirty="0">
                 <a:ea typeface="+mn-lt"/>
                 <a:cs typeface="+mn-lt"/>
               </a:rPr>
               <a:t>Optimized model configuration:</a:t>
             </a:r>
             <a:r>
-              <a:rPr lang="en-US" cap="none">
+              <a:rPr lang="en-US" cap="none" dirty="0">
                 <a:ea typeface="+mn-lt"/>
                 <a:cs typeface="+mn-lt"/>
               </a:rPr>
               <a:t> Choosing the best hyperparameters for our model, in order to obtain the best results.</a:t>
             </a:r>
-            <a:endParaRPr lang="en-US" cap="none"/>
+            <a:endParaRPr lang="en-US" cap="none" dirty="0"/>
           </a:p>
           <a:p>
             <a:pPr>
@@ -8975,20 +8992,20 @@
               </a:buClr>
             </a:pPr>
             <a:r>
-              <a:rPr lang="en-US" b="1" cap="none">
+              <a:rPr lang="en-US" b="1" cap="none" dirty="0">
                 <a:ea typeface="+mn-lt"/>
                 <a:cs typeface="+mn-lt"/>
               </a:rPr>
               <a:t>Efficient and accurate system:</a:t>
             </a:r>
             <a:r>
-              <a:rPr lang="en-US" cap="none">
+              <a:rPr lang="en-US" cap="none" dirty="0">
                 <a:ea typeface="+mn-lt"/>
                 <a:cs typeface="+mn-lt"/>
               </a:rPr>
               <a:t> Deliver a robust system capable of precisely segmenting MRI images while ensuring rapid processing times, capable of meeting clinical needs within acceptable inference durations.</a:t>
             </a:r>
-            <a:endParaRPr lang="en-US" cap="none"/>
+            <a:endParaRPr lang="en-US" cap="none" dirty="0"/>
           </a:p>
           <a:p>
             <a:pPr>
@@ -8996,7 +9013,7 @@
                 <a:srgbClr val="000000"/>
               </a:buClr>
             </a:pPr>
-            <a:endParaRPr lang="en-US"/>
+            <a:endParaRPr lang="en-US" dirty="0"/>
           </a:p>
         </p:txBody>
       </p:sp>
@@ -9042,7 +9059,7 @@
         </p:nvSpPr>
         <p:spPr>
           <a:xfrm>
-            <a:off x="1830841" y="2418"/>
+            <a:off x="1804527" y="147143"/>
             <a:ext cx="8534400" cy="1507067"/>
           </a:xfrm>
         </p:spPr>
@@ -9087,7 +9104,7 @@
               </a:buClr>
               <a:buNone/>
             </a:pPr>
-            <a:endParaRPr lang="en-US" cap="none"/>
+            <a:endParaRPr lang="en-US" cap="none" dirty="0"/>
           </a:p>
           <a:p>
             <a:pPr>
@@ -9096,20 +9113,20 @@
               </a:buClr>
             </a:pPr>
             <a:r>
-              <a:rPr lang="en-US" b="1" cap="none">
+              <a:rPr lang="en-US" b="1" cap="none" dirty="0">
                 <a:ea typeface="+mn-lt"/>
                 <a:cs typeface="+mn-lt"/>
               </a:rPr>
               <a:t>Dataset quality/variability:</a:t>
             </a:r>
             <a:r>
-              <a:rPr lang="en-US" cap="none">
+              <a:rPr lang="en-US" cap="none" dirty="0">
                 <a:ea typeface="+mn-lt"/>
                 <a:cs typeface="+mn-lt"/>
               </a:rPr>
               <a:t> MR image quality variations impact segmentation, these variations can be influenced by system models, manufacturers, sequence settings, and field shimming conditions. Additionally, slice-to-slice image variability (noise, artifacts) could affect segmentation accuracy.</a:t>
             </a:r>
-            <a:endParaRPr lang="en-US" cap="none"/>
+            <a:endParaRPr lang="en-US" cap="none" dirty="0"/>
           </a:p>
           <a:p>
             <a:pPr>
@@ -9118,20 +9135,20 @@
               </a:buClr>
             </a:pPr>
             <a:r>
-              <a:rPr lang="en-US" b="1" cap="none">
+              <a:rPr lang="en-US" b="1" cap="none" dirty="0">
                 <a:ea typeface="+mn-lt"/>
                 <a:cs typeface="+mn-lt"/>
               </a:rPr>
               <a:t>Complex environment:</a:t>
             </a:r>
             <a:r>
-              <a:rPr lang="en-US" cap="none">
+              <a:rPr lang="en-US" cap="none" dirty="0">
                 <a:ea typeface="+mn-lt"/>
                 <a:cs typeface="+mn-lt"/>
               </a:rPr>
               <a:t> The GI tract is a dense region, with overlapping organs, which requires precise analysis for successful radiation treatments.</a:t>
             </a:r>
-            <a:endParaRPr lang="en-US" cap="none"/>
+            <a:endParaRPr lang="en-US" cap="none" dirty="0"/>
           </a:p>
           <a:p>
             <a:pPr>
@@ -9140,11 +9157,11 @@
               </a:buClr>
             </a:pPr>
             <a:r>
-              <a:rPr lang="en-US" b="1" cap="none"/>
+              <a:rPr lang="en-US" b="1" cap="none" dirty="0"/>
               <a:t>Resources and time: </a:t>
             </a:r>
             <a:r>
-              <a:rPr lang="en-US" cap="none"/>
+              <a:rPr lang="en-US" cap="none" dirty="0"/>
               <a:t>Image segmentation is a delicate task, with little margin for error. Providing an automatic segmentation system which meets these demands while still able to perform a speedy inference requires a thorough understanding of the computer-vision field.</a:t>
             </a:r>
           </a:p>
@@ -9154,7 +9171,7 @@
                 <a:srgbClr val="FFFFFF"/>
               </a:buClr>
             </a:pPr>
-            <a:endParaRPr lang="en-US" cap="none"/>
+            <a:endParaRPr lang="en-US" cap="none" dirty="0"/>
           </a:p>
         </p:txBody>
       </p:sp>
@@ -9211,9 +9228,14 @@
           <a:lstStyle/>
           <a:p>
             <a:r>
-              <a:rPr lang="en-US" sz="8000" cap="none"/>
-              <a:t>Thank you!</a:t>
-            </a:r>
+              <a:rPr lang="en-US" sz="8000" cap="none" dirty="0"/>
+              <a:t>Thank you</a:t>
+            </a:r>
+            <a:r>
+              <a:rPr lang="en-US" sz="8000" cap="none" dirty="0" smtClean="0"/>
+              <a:t>!</a:t>
+            </a:r>
+            <a:endParaRPr lang="en-US" sz="8000" cap="none" dirty="0"/>
           </a:p>
         </p:txBody>
       </p:sp>
@@ -9269,10 +9291,10 @@
           <a:p>
             <a:pPr algn="ctr"/>
             <a:r>
-              <a:rPr lang="en-US" cap="none"/>
+              <a:rPr lang="en-US" cap="none" dirty="0"/>
               <a:t>Motivation</a:t>
             </a:r>
-            <a:endParaRPr lang="en-US"/>
+            <a:endParaRPr lang="en-US" dirty="0"/>
           </a:p>
         </p:txBody>
       </p:sp>
@@ -9289,7 +9311,7 @@
         <p:spPr>
           <a:xfrm>
             <a:off x="705304" y="1195040"/>
-            <a:ext cx="8534400" cy="5322276"/>
+            <a:ext cx="7782850" cy="5243597"/>
           </a:xfrm>
         </p:spPr>
         <p:txBody>
@@ -9299,7 +9321,7 @@
           <a:lstStyle/>
           <a:p>
             <a:r>
-              <a:rPr lang="en-US" cap="none">
+              <a:rPr lang="en-US" b="1" cap="none" dirty="0">
                 <a:solidFill>
                   <a:schemeClr val="tx1"/>
                 </a:solidFill>
@@ -9307,7 +9329,7 @@
               <a:t>Urgency</a:t>
             </a:r>
             <a:r>
-              <a:rPr lang="he-IL" cap="none">
+              <a:rPr lang="he-IL" cap="none" dirty="0">
                 <a:solidFill>
                   <a:schemeClr val="tx1"/>
                 </a:solidFill>
@@ -9315,7 +9337,7 @@
               <a:t>:</a:t>
             </a:r>
             <a:r>
-              <a:rPr lang="en-US" cap="none">
+              <a:rPr lang="en-US" cap="none" dirty="0">
                 <a:solidFill>
                   <a:schemeClr val="tx1"/>
                 </a:solidFill>
@@ -9325,36 +9347,68 @@
           </a:p>
           <a:p>
             <a:r>
-              <a:rPr lang="en-US" cap="none">
+              <a:rPr lang="en-US" b="1" cap="none" dirty="0">
                 <a:solidFill>
                   <a:schemeClr val="tx1"/>
                 </a:solidFill>
               </a:rPr>
-              <a:t>Need for precision: precise segmentation directly influences the effectiveness of radiation doses, impacting the ability to minimize damage to healthy tissues while aggressively treating cancerous areas.</a:t>
-            </a:r>
-          </a:p>
-          <a:p>
-            <a:r>
-              <a:rPr lang="en-US" cap="none">
+              <a:t>Need for precision</a:t>
+            </a:r>
+            <a:r>
+              <a:rPr lang="en-US" cap="none" dirty="0">
                 <a:solidFill>
                   <a:schemeClr val="tx1"/>
                 </a:solidFill>
               </a:rPr>
-              <a:t>Potential of AI in medical imaging: artificial intelligence, especially deep learning, has shown promising results in various fields of medicine, suggesting significant potential for revolutionizing MRI image segmentation.</a:t>
-            </a:r>
-          </a:p>
-          <a:p>
-            <a:r>
-              <a:rPr lang="en-US" cap="none">
+              <a:t>: precise segmentation directly influences the effectiveness of radiation doses, impacting the ability to minimize damage to healthy tissues while aggressively treating cancerous areas.</a:t>
+            </a:r>
+          </a:p>
+          <a:p>
+            <a:r>
+              <a:rPr lang="en-US" b="1" cap="none" dirty="0">
                 <a:solidFill>
                   <a:schemeClr val="tx1"/>
                 </a:solidFill>
               </a:rPr>
-              <a:t>Improving patient comfort and outcomes: by reducing the duration and increasing the accuracy of radiation therapy sessions, the project aims to enhance patient comfort and clinical outcomes.</a:t>
-            </a:r>
-          </a:p>
-          <a:p>
-            <a:endParaRPr lang="en-US" cap="none">
+              <a:t>Potential of AI </a:t>
+            </a:r>
+            <a:r>
+              <a:rPr lang="en-US" cap="none" dirty="0">
+                <a:solidFill>
+                  <a:schemeClr val="tx1"/>
+                </a:solidFill>
+              </a:rPr>
+              <a:t>in medical imaging: artificial intelligence, especially deep learning, has shown promising results in various fields of medicine, suggesting significant potential for revolutionizing MRI image segmentation.</a:t>
+            </a:r>
+          </a:p>
+          <a:p>
+            <a:r>
+              <a:rPr lang="en-US" cap="none" dirty="0">
+                <a:solidFill>
+                  <a:schemeClr val="tx1"/>
+                </a:solidFill>
+              </a:rPr>
+              <a:t>Improving </a:t>
+            </a:r>
+            <a:r>
+              <a:rPr lang="en-US" b="1" cap="none" dirty="0">
+                <a:solidFill>
+                  <a:schemeClr val="tx1"/>
+                </a:solidFill>
+              </a:rPr>
+              <a:t>patient comfort and outcomes</a:t>
+            </a:r>
+            <a:r>
+              <a:rPr lang="en-US" cap="none" dirty="0">
+                <a:solidFill>
+                  <a:schemeClr val="tx1"/>
+                </a:solidFill>
+              </a:rPr>
+              <a:t>: by reducing the duration and increasing the accuracy of radiation therapy sessions, the project aims to enhance patient comfort and clinical outcomes.</a:t>
+            </a:r>
+          </a:p>
+          <a:p>
+            <a:endParaRPr lang="en-US" cap="none" dirty="0">
               <a:solidFill>
                 <a:schemeClr val="tx1"/>
               </a:solidFill>
@@ -9367,7 +9421,7 @@
           <p:cNvPr id="4" name="Picture 3">
             <a:extLst>
               <a:ext uri="{FF2B5EF4-FFF2-40B4-BE49-F238E27FC236}">
-                <a16:creationId xmlns:a16="http://schemas.microsoft.com/office/drawing/2014/main" id="{73181652-88EF-711D-B0EF-6ED99DE75787}"/>
+                <a16:creationId xmlns:a16="http://schemas.microsoft.com/office/drawing/2014/main" xmlns="" id="{73181652-88EF-711D-B0EF-6ED99DE75787}"/>
               </a:ext>
             </a:extLst>
           </p:cNvPr>
@@ -9384,12 +9438,22 @@
         </p:blipFill>
         <p:spPr>
           <a:xfrm>
-            <a:off x="8948645" y="1444170"/>
-            <a:ext cx="3126057" cy="1715341"/>
+            <a:off x="8334327" y="2356301"/>
+            <a:ext cx="3773587" cy="2070656"/>
           </a:xfrm>
           <a:prstGeom prst="rect">
             <a:avLst/>
           </a:prstGeom>
+          <a:ln>
+            <a:noFill/>
+          </a:ln>
+          <a:effectLst>
+            <a:outerShdw blurRad="292100" dist="139700" dir="2700000" algn="tl" rotWithShape="0">
+              <a:srgbClr val="333333">
+                <a:alpha val="65000"/>
+              </a:srgbClr>
+            </a:outerShdw>
+          </a:effectLst>
         </p:spPr>
       </p:pic>
     </p:spTree>
@@ -9444,9 +9508,14 @@
           <a:p>
             <a:pPr algn="ctr"/>
             <a:r>
-              <a:rPr lang="en-US" cap="none"/>
-              <a:t>The problem</a:t>
-            </a:r>
+              <a:rPr lang="en-US" cap="none" dirty="0"/>
+              <a:t>The </a:t>
+            </a:r>
+            <a:r>
+              <a:rPr lang="en-US" cap="none" dirty="0" smtClean="0"/>
+              <a:t>Problem</a:t>
+            </a:r>
+            <a:endParaRPr lang="en-US" cap="none" dirty="0"/>
           </a:p>
         </p:txBody>
       </p:sp>
@@ -9463,7 +9532,7 @@
         <p:spPr>
           <a:xfrm>
             <a:off x="800327" y="1207295"/>
-            <a:ext cx="8534400" cy="5566368"/>
+            <a:ext cx="10626520" cy="5566368"/>
           </a:xfrm>
         </p:spPr>
         <p:txBody>
@@ -9473,15 +9542,23 @@
           <a:lstStyle/>
           <a:p>
             <a:r>
-              <a:rPr lang="en-US" cap="none">
+              <a:rPr lang="en-US" b="1" cap="none" dirty="0">
                 <a:solidFill>
                   <a:schemeClr val="tx1"/>
                 </a:solidFill>
               </a:rPr>
-              <a:t>Limitations of current imaging technologies: the integration of MRI with radiation therapy devices (e.g., MR-</a:t>
-            </a:r>
-            <a:r>
-              <a:rPr lang="en-US" cap="none" err="1">
+              <a:t>Limitations of current imaging technologies</a:t>
+            </a:r>
+            <a:r>
+              <a:rPr lang="en-US" cap="none" dirty="0">
+                <a:solidFill>
+                  <a:schemeClr val="tx1"/>
+                </a:solidFill>
+              </a:rPr>
+              <a:t>: the integration of MRI with radiation therapy devices (e.g., MR-</a:t>
+            </a:r>
+            <a:r>
+              <a:rPr lang="en-US" cap="none" dirty="0" err="1">
                 <a:solidFill>
                   <a:schemeClr val="tx1"/>
                 </a:solidFill>
@@ -9489,7 +9566,7 @@
               <a:t>Linacs</a:t>
             </a:r>
             <a:r>
-              <a:rPr lang="en-US" cap="none">
+              <a:rPr lang="en-US" cap="none" dirty="0">
                 <a:solidFill>
                   <a:schemeClr val="tx1"/>
                 </a:solidFill>
@@ -9499,45 +9576,85 @@
           </a:p>
           <a:p>
             <a:r>
-              <a:rPr lang="en-US" cap="none">
+              <a:rPr lang="en-US" b="1" cap="none" dirty="0">
                 <a:solidFill>
                   <a:schemeClr val="tx1"/>
                 </a:solidFill>
               </a:rPr>
-              <a:t>Time-consuming: it can extend treatment times significantly, often requiring up to an hour per session.</a:t>
-            </a:r>
-          </a:p>
-          <a:p>
-            <a:r>
-              <a:rPr lang="en-US" cap="none">
+              <a:t>Time-consuming</a:t>
+            </a:r>
+            <a:r>
+              <a:rPr lang="en-US" cap="none" dirty="0">
                 <a:solidFill>
                   <a:schemeClr val="tx1"/>
                 </a:solidFill>
               </a:rPr>
-              <a:t>Labor-intensive: requires extensive effort from skilled radiologists.</a:t>
-            </a:r>
-          </a:p>
-          <a:p>
-            <a:r>
-              <a:rPr lang="en-US" cap="none">
+              <a:t>: it can extend treatment times significantly, often requiring up to an hour per session.</a:t>
+            </a:r>
+          </a:p>
+          <a:p>
+            <a:r>
+              <a:rPr lang="en-US" b="1" cap="none" dirty="0">
                 <a:solidFill>
                   <a:schemeClr val="tx1"/>
                 </a:solidFill>
               </a:rPr>
-              <a:t>Error-prone: subject to human error, potentially affecting treatment accuracy.</a:t>
-            </a:r>
-          </a:p>
-          <a:p>
-            <a:r>
-              <a:rPr lang="en-US" cap="none">
+              <a:t>Labor-intensive</a:t>
+            </a:r>
+            <a:r>
+              <a:rPr lang="en-US" cap="none" dirty="0">
                 <a:solidFill>
                   <a:schemeClr val="tx1"/>
                 </a:solidFill>
               </a:rPr>
-              <a:t>Inadequate segmentation models: existing</a:t>
-            </a:r>
-            <a:r>
-              <a:rPr lang="he-IL" cap="none">
+              <a:t>: requires extensive effort from skilled radiologists.</a:t>
+            </a:r>
+          </a:p>
+          <a:p>
+            <a:r>
+              <a:rPr lang="en-US" b="1" cap="none" dirty="0">
+                <a:solidFill>
+                  <a:schemeClr val="tx1"/>
+                </a:solidFill>
+              </a:rPr>
+              <a:t>Error-prone</a:t>
+            </a:r>
+            <a:r>
+              <a:rPr lang="en-US" cap="none" dirty="0">
+                <a:solidFill>
+                  <a:schemeClr val="tx1"/>
+                </a:solidFill>
+              </a:rPr>
+              <a:t>: subject to human error, potentially affecting treatment accuracy.</a:t>
+            </a:r>
+          </a:p>
+          <a:p>
+            <a:r>
+              <a:rPr lang="en-US" b="1" cap="none" dirty="0" smtClean="0">
+                <a:solidFill>
+                  <a:schemeClr val="tx1"/>
+                </a:solidFill>
+              </a:rPr>
+              <a:t>Inadequate segmentation models</a:t>
+            </a:r>
+            <a:r>
+              <a:rPr lang="en-US" cap="none" dirty="0" smtClean="0">
+                <a:solidFill>
+                  <a:schemeClr val="tx1"/>
+                </a:solidFill>
+              </a:rPr>
+              <a:t>: </a:t>
+            </a:r>
+            <a:r>
+              <a:rPr lang="en-US" cap="none" dirty="0">
+                <a:solidFill>
+                  <a:schemeClr val="tx1"/>
+                </a:solidFill>
+              </a:rPr>
+              <a:t>existing</a:t>
+            </a:r>
+            <a:r>
+              <a:rPr lang="he-IL" cap="none" dirty="0">
                 <a:solidFill>
                   <a:schemeClr val="tx1"/>
                 </a:solidFill>
@@ -9545,15 +9662,31 @@
               <a:t> </a:t>
             </a:r>
             <a:r>
-              <a:rPr lang="en-US" cap="none">
+              <a:rPr lang="en-US" cap="none" dirty="0">
                 <a:solidFill>
                   <a:schemeClr val="tx1"/>
                 </a:solidFill>
               </a:rPr>
-              <a:t>models do not yet achieve the level of accuracy needed for effective radiation therapy</a:t>
-            </a:r>
-            <a:r>
-              <a:rPr lang="he-IL" cap="none">
+              <a:t>models do not yet achieve the level of accuracy </a:t>
+            </a:r>
+            <a:r>
+              <a:rPr lang="en-US" cap="none" dirty="0" smtClean="0">
+                <a:solidFill>
+                  <a:schemeClr val="tx1"/>
+                </a:solidFill>
+              </a:rPr>
+              <a:t>needed </a:t>
+            </a:r>
+            <a:r>
+              <a:rPr lang="en-US" cap="none" dirty="0">
+                <a:solidFill>
+                  <a:schemeClr val="tx1"/>
+                </a:solidFill>
+              </a:rPr>
+              <a:t>for effective radiation therapy</a:t>
+            </a:r>
+            <a:r>
+              <a:rPr lang="he-IL" cap="none" dirty="0">
                 <a:solidFill>
                   <a:schemeClr val="tx1"/>
                 </a:solidFill>
@@ -9561,7 +9694,7 @@
               <a:t> </a:t>
             </a:r>
             <a:r>
-              <a:rPr lang="en-US" cap="none">
+              <a:rPr lang="en-US" cap="none" dirty="0">
                 <a:solidFill>
                   <a:schemeClr val="tx1"/>
                 </a:solidFill>
@@ -9570,14 +9703,14 @@
             </a:r>
           </a:p>
           <a:p>
-            <a:endParaRPr lang="en-US" cap="none">
+            <a:endParaRPr lang="en-US" cap="none" dirty="0">
               <a:solidFill>
                 <a:schemeClr val="tx1"/>
               </a:solidFill>
             </a:endParaRPr>
           </a:p>
           <a:p>
-            <a:endParaRPr lang="en-US" cap="none">
+            <a:endParaRPr lang="en-US" cap="none" dirty="0">
               <a:solidFill>
                 <a:schemeClr val="tx1"/>
               </a:solidFill>
@@ -9637,9 +9770,14 @@
           <a:p>
             <a:pPr algn="ctr"/>
             <a:r>
-              <a:rPr lang="en-US" cap="none"/>
-              <a:t>Project objectives</a:t>
-            </a:r>
+              <a:rPr lang="en-US" cap="none" dirty="0"/>
+              <a:t>Project </a:t>
+            </a:r>
+            <a:r>
+              <a:rPr lang="en-US" cap="none" dirty="0" smtClean="0"/>
+              <a:t>Objectives</a:t>
+            </a:r>
+            <a:endParaRPr lang="en-US" cap="none" dirty="0"/>
           </a:p>
         </p:txBody>
       </p:sp>
@@ -9656,46 +9794,110 @@
         <p:spPr>
           <a:xfrm>
             <a:off x="800327" y="1447801"/>
-            <a:ext cx="8534400" cy="3615267"/>
+            <a:ext cx="10573756" cy="3615267"/>
           </a:xfrm>
         </p:spPr>
         <p:txBody>
           <a:bodyPr>
-            <a:normAutofit fontScale="92500" lnSpcReduction="10000"/>
+            <a:normAutofit lnSpcReduction="10000"/>
           </a:bodyPr>
           <a:lstStyle/>
           <a:p>
             <a:r>
-              <a:rPr lang="en-US" cap="none">
+              <a:rPr lang="en-US" cap="none" dirty="0">
                 <a:solidFill>
                   <a:schemeClr val="tx1"/>
                 </a:solidFill>
               </a:rPr>
-              <a:t>Main goal: to develop and validate a segmentation model that utilizes transformer-based architectures integrated with a U-Net model, aiming to surpass current state-of-the-art segmentation models in terms of accuracy.</a:t>
-            </a:r>
-          </a:p>
-          <a:p>
-            <a:r>
-              <a:rPr lang="en-US" cap="none">
+              <a:t>Main goal: to </a:t>
+            </a:r>
+            <a:r>
+              <a:rPr lang="en-US" b="1" cap="none" dirty="0">
                 <a:solidFill>
                   <a:schemeClr val="tx1"/>
                 </a:solidFill>
               </a:rPr>
-              <a:t>Comprehensive testing: the developed model will be rigorously tested using the UW-Madison GI tract dataset, focusing on its ability to accurately segment tumor tissue as well as the stomach and intestines, providing safe margins for radiology treatments.</a:t>
-            </a:r>
-          </a:p>
-          <a:p>
-            <a:r>
-              <a:rPr lang="en-US" cap="none">
+              <a:t>develop </a:t>
+            </a:r>
+            <a:r>
+              <a:rPr lang="en-US" cap="none" dirty="0">
                 <a:solidFill>
                   <a:schemeClr val="tx1"/>
                 </a:solidFill>
               </a:rPr>
-              <a:t>Performance metrics: evaluate the model’s performance based on established metrics such as the dice coefficient and Intersection Over Union (IOU), aiming for improvements over benchmarks set by current models.</a:t>
-            </a:r>
-          </a:p>
-          <a:p>
-            <a:endParaRPr lang="en-US"/>
+              <a:t>and validate </a:t>
+            </a:r>
+            <a:r>
+              <a:rPr lang="en-US" b="1" cap="none" dirty="0">
+                <a:solidFill>
+                  <a:schemeClr val="tx1"/>
+                </a:solidFill>
+              </a:rPr>
+              <a:t>a segmentation model </a:t>
+            </a:r>
+            <a:r>
+              <a:rPr lang="en-US" cap="none" dirty="0">
+                <a:solidFill>
+                  <a:schemeClr val="tx1"/>
+                </a:solidFill>
+              </a:rPr>
+              <a:t>that utilizes transformer-based architectures integrated with a U-Net model, aiming to surpass current state-of-the-art segmentation models in terms of accuracy.</a:t>
+            </a:r>
+          </a:p>
+          <a:p>
+            <a:r>
+              <a:rPr lang="en-US" cap="none" dirty="0">
+                <a:solidFill>
+                  <a:schemeClr val="tx1"/>
+                </a:solidFill>
+              </a:rPr>
+              <a:t>Comprehensive testing: the developed model will be </a:t>
+            </a:r>
+            <a:r>
+              <a:rPr lang="en-US" b="1" cap="none" dirty="0">
+                <a:solidFill>
+                  <a:schemeClr val="tx1"/>
+                </a:solidFill>
+              </a:rPr>
+              <a:t>rigorously tested </a:t>
+            </a:r>
+            <a:r>
+              <a:rPr lang="en-US" cap="none" dirty="0">
+                <a:solidFill>
+                  <a:schemeClr val="tx1"/>
+                </a:solidFill>
+              </a:rPr>
+              <a:t>using the UW-Madison GI tract dataset, focusing on its ability to accurately segment tumor tissue as well as the stomach and intestines, providing safe margins for radiology treatments.</a:t>
+            </a:r>
+          </a:p>
+          <a:p>
+            <a:r>
+              <a:rPr lang="en-US" cap="none" dirty="0">
+                <a:solidFill>
+                  <a:schemeClr val="tx1"/>
+                </a:solidFill>
+              </a:rPr>
+              <a:t>Performance metrics: </a:t>
+            </a:r>
+            <a:r>
+              <a:rPr lang="en-US" b="1" cap="none" dirty="0">
+                <a:solidFill>
+                  <a:schemeClr val="tx1"/>
+                </a:solidFill>
+              </a:rPr>
+              <a:t>evaluate</a:t>
+            </a:r>
+            <a:r>
+              <a:rPr lang="en-US" cap="none" dirty="0">
+                <a:solidFill>
+                  <a:schemeClr val="tx1"/>
+                </a:solidFill>
+              </a:rPr>
+              <a:t> the model’s performance based on established metrics such as the dice coefficient and Intersection Over Union (IOU), aiming for improvements over benchmarks set by current models.</a:t>
+            </a:r>
+          </a:p>
+          <a:p>
+            <a:endParaRPr lang="en-US" dirty="0"/>
           </a:p>
         </p:txBody>
       </p:sp>
@@ -9751,7 +9953,7 @@
           <a:p>
             <a:pPr algn="ctr"/>
             <a:r>
-              <a:rPr lang="en-US" cap="none"/>
+              <a:rPr lang="en-US" cap="none" dirty="0"/>
               <a:t>U-Net based segmentation in radiation treatment</a:t>
             </a:r>
           </a:p>
@@ -9762,7 +9964,7 @@
           <p:cNvPr id="3" name="Picture 2" descr="A close-up of a ultrasound&#10;&#10;Description automatically generated">
             <a:extLst>
               <a:ext uri="{FF2B5EF4-FFF2-40B4-BE49-F238E27FC236}">
-                <a16:creationId xmlns:a16="http://schemas.microsoft.com/office/drawing/2014/main" id="{8B072C8D-EEFD-4EC4-1B94-915D9AF1127F}"/>
+                <a16:creationId xmlns:a16="http://schemas.microsoft.com/office/drawing/2014/main" xmlns="" id="{8B072C8D-EEFD-4EC4-1B94-915D9AF1127F}"/>
               </a:ext>
             </a:extLst>
           </p:cNvPr>
@@ -9784,6 +9986,16 @@
           <a:prstGeom prst="rect">
             <a:avLst/>
           </a:prstGeom>
+          <a:ln>
+            <a:noFill/>
+          </a:ln>
+          <a:effectLst>
+            <a:outerShdw blurRad="292100" dist="139700" dir="2700000" algn="tl" rotWithShape="0">
+              <a:srgbClr val="333333">
+                <a:alpha val="65000"/>
+              </a:srgbClr>
+            </a:outerShdw>
+          </a:effectLst>
         </p:spPr>
       </p:pic>
       <p:sp>
@@ -9791,7 +10003,7 @@
           <p:cNvPr id="6" name="TextBox 5">
             <a:extLst>
               <a:ext uri="{FF2B5EF4-FFF2-40B4-BE49-F238E27FC236}">
-                <a16:creationId xmlns:a16="http://schemas.microsoft.com/office/drawing/2014/main" id="{405F5A35-86FD-A732-4EBD-ACC5ECD8C191}"/>
+                <a16:creationId xmlns:a16="http://schemas.microsoft.com/office/drawing/2014/main" xmlns="" id="{405F5A35-86FD-A732-4EBD-ACC5ECD8C191}"/>
               </a:ext>
             </a:extLst>
           </p:cNvPr>
@@ -9800,7 +10012,7 @@
         </p:nvSpPr>
         <p:spPr>
           <a:xfrm>
-            <a:off x="2296885" y="5072743"/>
+            <a:off x="2295299" y="4890552"/>
             <a:ext cx="7605484" cy="646331"/>
           </a:xfrm>
           <a:prstGeom prst="rect">
@@ -9818,7 +10030,7 @@
           <a:lstStyle/>
           <a:p>
             <a:r>
-              <a:rPr lang="en-US"/>
+              <a:rPr lang="en-US" dirty="0"/>
               <a:t>Segmentation masks of the stomach and intestines. Pink – tumor, Red – stomach. Radiation levels shown in color gradient.</a:t>
             </a:r>
           </a:p>
@@ -9876,10 +10088,14 @@
           <a:p>
             <a:pPr algn="ctr"/>
             <a:r>
-              <a:rPr lang="en-US" cap="none"/>
-              <a:t>Proposed solution </a:t>
-            </a:r>
-            <a:endParaRPr lang="en-US"/>
+              <a:rPr lang="en-US" cap="none" dirty="0"/>
+              <a:t>Proposed </a:t>
+            </a:r>
+            <a:r>
+              <a:rPr lang="en-US" cap="none" dirty="0" smtClean="0"/>
+              <a:t>Solution </a:t>
+            </a:r>
+            <a:endParaRPr lang="en-US" dirty="0"/>
           </a:p>
         </p:txBody>
       </p:sp>
@@ -9895,7 +10111,7 @@
         </p:nvSpPr>
         <p:spPr>
           <a:xfrm>
-            <a:off x="858305" y="1364975"/>
+            <a:off x="1830840" y="1169483"/>
             <a:ext cx="8534400" cy="3615267"/>
           </a:xfrm>
         </p:spPr>
@@ -9906,7 +10122,7 @@
           <a:lstStyle/>
           <a:p>
             <a:r>
-              <a:rPr lang="en-US" cap="none"/>
+              <a:rPr lang="en-US" cap="none" dirty="0"/>
               <a:t>A U-Net inspired model which incorporates the transformer attention mechanism.</a:t>
             </a:r>
           </a:p>
@@ -9917,7 +10133,7 @@
           <p:cNvPr id="5" name="Content Placeholder 5">
             <a:extLst>
               <a:ext uri="{FF2B5EF4-FFF2-40B4-BE49-F238E27FC236}">
-                <a16:creationId xmlns:a16="http://schemas.microsoft.com/office/drawing/2014/main" id="{DE5CCAD5-9E80-E0AC-152E-ECEFB48F95AB}"/>
+                <a16:creationId xmlns:a16="http://schemas.microsoft.com/office/drawing/2014/main" xmlns="" id="{DE5CCAD5-9E80-E0AC-152E-ECEFB48F95AB}"/>
               </a:ext>
             </a:extLst>
           </p:cNvPr>
@@ -9934,8 +10150,8 @@
         </p:blipFill>
         <p:spPr>
           <a:xfrm>
-            <a:off x="2798891" y="1969398"/>
-            <a:ext cx="6594216" cy="4119976"/>
+            <a:off x="2353174" y="1780211"/>
+            <a:ext cx="7489733" cy="4679483"/>
           </a:xfrm>
           <a:prstGeom prst="rect">
             <a:avLst/>
@@ -10015,7 +10231,7 @@
           <p:cNvPr id="4" name="TextBox 3">
             <a:extLst>
               <a:ext uri="{FF2B5EF4-FFF2-40B4-BE49-F238E27FC236}">
-                <a16:creationId xmlns:a16="http://schemas.microsoft.com/office/drawing/2014/main" id="{0F7FED2E-18CB-B81F-6F9D-11C3C79A4BEF}"/>
+                <a16:creationId xmlns:a16="http://schemas.microsoft.com/office/drawing/2014/main" xmlns="" id="{0F7FED2E-18CB-B81F-6F9D-11C3C79A4BEF}"/>
               </a:ext>
             </a:extLst>
           </p:cNvPr>
@@ -10024,8 +10240,8 @@
         </p:nvSpPr>
         <p:spPr>
           <a:xfrm>
-            <a:off x="551543" y="1233716"/>
-            <a:ext cx="10022110" cy="2015936"/>
+            <a:off x="551543" y="1061417"/>
+            <a:ext cx="10022110" cy="2739211"/>
           </a:xfrm>
           <a:prstGeom prst="rect">
             <a:avLst/>
@@ -10050,26 +10266,60 @@
               </a:spcAft>
             </a:pPr>
             <a:r>
-              <a:rPr lang="en-US" sz="2000"/>
-              <a:t>The attention function mimics cognitive attention, aiming to highlight relevant regions in input data, enhancing context and relationships.</a:t>
-            </a:r>
-          </a:p>
-          <a:p>
-            <a:r>
-              <a:rPr lang="en-US" sz="2000"/>
-              <a:t>The attention operation is used in almost all state-of-the-art U-Net variants. </a:t>
-            </a:r>
-            <a:endParaRPr lang="en-US"/>
-          </a:p>
-          <a:p>
-            <a:r>
-              <a:rPr lang="en-US" sz="2000"/>
+              <a:rPr lang="en-US" sz="2000" dirty="0"/>
+              <a:t>The </a:t>
+            </a:r>
+            <a:r>
+              <a:rPr lang="en-US" sz="2000" dirty="0" smtClean="0"/>
+              <a:t>Attention </a:t>
+            </a:r>
+            <a:r>
+              <a:rPr lang="en-US" sz="2000" dirty="0"/>
+              <a:t>function mimics cognitive attention, aiming to highlight relevant regions in input data, enhancing context and relationships</a:t>
+            </a:r>
+            <a:r>
+              <a:rPr lang="en-US" sz="2000" dirty="0" smtClean="0"/>
+              <a:t>.</a:t>
+            </a:r>
+          </a:p>
+          <a:p>
+            <a:pPr>
+              <a:spcBef>
+                <a:spcPct val="20000"/>
+              </a:spcBef>
+              <a:spcAft>
+                <a:spcPts val="600"/>
+              </a:spcAft>
+            </a:pPr>
+            <a:endParaRPr lang="en-US" sz="2000" dirty="0"/>
+          </a:p>
+          <a:p>
+            <a:r>
+              <a:rPr lang="en-US" sz="2000" dirty="0"/>
+              <a:t>The </a:t>
+            </a:r>
+            <a:r>
+              <a:rPr lang="en-US" sz="2000" dirty="0" smtClean="0"/>
+              <a:t>Attention </a:t>
+            </a:r>
+            <a:r>
+              <a:rPr lang="en-US" sz="2000" dirty="0"/>
+              <a:t>operation is used in almost all state-of-the-art U-Net variants. </a:t>
+            </a:r>
+            <a:endParaRPr lang="en-US" sz="2000" dirty="0" smtClean="0"/>
+          </a:p>
+          <a:p>
+            <a:endParaRPr lang="en-US" dirty="0"/>
+          </a:p>
+          <a:p>
+            <a:r>
+              <a:rPr lang="en-US" sz="2000" dirty="0"/>
               <a:t>First proposed in the now-famous article "Attention is all you need" in 2017, changing the ML world. ​</a:t>
             </a:r>
-            <a:endParaRPr lang="en-US"/>
-          </a:p>
-          <a:p>
-            <a:endParaRPr lang="en-US" sz="2000">
+            <a:endParaRPr lang="en-US" dirty="0"/>
+          </a:p>
+          <a:p>
+            <a:endParaRPr lang="en-US" sz="2000" dirty="0">
               <a:solidFill>
                 <a:schemeClr val="bg2"/>
               </a:solidFill>
@@ -10082,7 +10332,7 @@
           <p:cNvPr id="7" name="Picture 6" descr="A mathematical equation with black text&#10;&#10;Description automatically generated">
             <a:extLst>
               <a:ext uri="{FF2B5EF4-FFF2-40B4-BE49-F238E27FC236}">
-                <a16:creationId xmlns:a16="http://schemas.microsoft.com/office/drawing/2014/main" id="{09E4B404-05E5-FD28-082E-C12AA0C15926}"/>
+                <a16:creationId xmlns:a16="http://schemas.microsoft.com/office/drawing/2014/main" xmlns="" id="{09E4B404-05E5-FD28-082E-C12AA0C15926}"/>
               </a:ext>
             </a:extLst>
           </p:cNvPr>
@@ -10099,7 +10349,7 @@
         </p:blipFill>
         <p:spPr>
           <a:xfrm>
-            <a:off x="2766441" y="3743872"/>
+            <a:off x="2764465" y="3800628"/>
             <a:ext cx="5596266" cy="1235133"/>
           </a:xfrm>
           <a:prstGeom prst="rect">
@@ -10173,34 +10423,14 @@
           <a:p>
             <a:pPr algn="ctr"/>
             <a:r>
-              <a:rPr lang="en-US" cap="none"/>
-              <a:t>Baseline Model</a:t>
-            </a:r>
-            <a:endParaRPr lang="en-US"/>
-          </a:p>
-        </p:txBody>
-      </p:sp>
-      <p:sp>
-        <p:nvSpPr>
-          <p:cNvPr id="3" name="Content Placeholder 2"/>
-          <p:cNvSpPr>
-            <a:spLocks noGrp="1"/>
-          </p:cNvSpPr>
-          <p:nvPr>
-            <p:ph idx="1"/>
-          </p:nvPr>
-        </p:nvSpPr>
-        <p:spPr>
-          <a:xfrm>
-            <a:off x="800327" y="1447801"/>
-            <a:ext cx="8534400" cy="3615267"/>
-          </a:xfrm>
-        </p:spPr>
-        <p:txBody>
-          <a:bodyPr/>
-          <a:lstStyle/>
-          <a:p>
-            <a:endParaRPr lang="en-US"/>
+              <a:rPr lang="en-US" cap="none" dirty="0"/>
+              <a:t>Baseline </a:t>
+            </a:r>
+            <a:r>
+              <a:rPr lang="en-US" cap="none" dirty="0" smtClean="0"/>
+              <a:t>Model</a:t>
+            </a:r>
+            <a:endParaRPr lang="en-US" dirty="0"/>
           </a:p>
         </p:txBody>
       </p:sp>
@@ -10209,7 +10439,7 @@
           <p:cNvPr id="4" name="Picture 3">
             <a:extLst>
               <a:ext uri="{FF2B5EF4-FFF2-40B4-BE49-F238E27FC236}">
-                <a16:creationId xmlns:a16="http://schemas.microsoft.com/office/drawing/2014/main" id="{8F7125B5-ECF1-30F7-5234-B14ACF66D81D}"/>
+                <a16:creationId xmlns:a16="http://schemas.microsoft.com/office/drawing/2014/main" xmlns="" id="{8F7125B5-ECF1-30F7-5234-B14ACF66D81D}"/>
               </a:ext>
             </a:extLst>
           </p:cNvPr>
@@ -10232,12 +10462,22 @@
         </p:blipFill>
         <p:spPr>
           <a:xfrm>
-            <a:off x="2393772" y="1546821"/>
+            <a:off x="2395813" y="1332410"/>
             <a:ext cx="7404456" cy="4768061"/>
           </a:xfrm>
           <a:prstGeom prst="rect">
             <a:avLst/>
           </a:prstGeom>
+          <a:ln>
+            <a:noFill/>
+          </a:ln>
+          <a:effectLst>
+            <a:outerShdw blurRad="292100" dist="139700" dir="2700000" algn="tl" rotWithShape="0">
+              <a:srgbClr val="333333">
+                <a:alpha val="65000"/>
+              </a:srgbClr>
+            </a:outerShdw>
+          </a:effectLst>
         </p:spPr>
       </p:pic>
     </p:spTree>
@@ -10328,7 +10568,23 @@
             </a:pPr>
             <a:r>
               <a:rPr lang="en-US" cap="none" dirty="0"/>
-              <a:t>Using a transformer-U-Net architecture as our backbone, we will provide a user-application for simple, easy to use MRI segmentation.</a:t>
+              <a:t>Using a </a:t>
+            </a:r>
+            <a:r>
+              <a:rPr lang="en-US" b="1" cap="none" dirty="0" smtClean="0"/>
+              <a:t>T</a:t>
+            </a:r>
+            <a:r>
+              <a:rPr lang="en-US" b="1" cap="none" dirty="0" smtClean="0"/>
+              <a:t>ransformer U-Net</a:t>
+            </a:r>
+            <a:r>
+              <a:rPr lang="en-US" cap="none" dirty="0" smtClean="0"/>
+              <a:t> </a:t>
+            </a:r>
+            <a:r>
+              <a:rPr lang="en-US" cap="none" dirty="0"/>
+              <a:t>architecture as our backbone, we will provide a user-application for simple, easy to use MRI segmentation.</a:t>
             </a:r>
           </a:p>
           <a:p>
@@ -10352,7 +10608,7 @@
                 <a:srgbClr val="FFFFFF"/>
               </a:buClr>
             </a:pPr>
-            <a:endParaRPr lang="he" sz="1200">
+            <a:endParaRPr lang="he" sz="1200" dirty="0">
               <a:ea typeface="+mn-lt"/>
               <a:cs typeface="+mn-lt"/>
             </a:endParaRPr>

</xml_diff>